<commit_message>
Avg. Monthly Earnings Project - Overview background size updated
</commit_message>
<xml_diff>
--- a/PowerBI/Projects/Average Monthly Earnings EU/Backgrounds/Backgrounds - Overview.pptx
+++ b/PowerBI/Projects/Average Monthly Earnings EU/Backgrounds/Backgrounds - Overview.pptx
@@ -2,12 +2,12 @@
 <file path=ppt/presentation.xml><?xml version="1.0" encoding="utf-8"?>
 <p:presentation xmlns:a="http://schemas.openxmlformats.org/drawingml/2006/main" xmlns:r="http://schemas.openxmlformats.org/officeDocument/2006/relationships" xmlns:p="http://schemas.openxmlformats.org/presentationml/2006/main" saveSubsetFonts="1">
   <p:sldMasterIdLst>
-    <p:sldMasterId id="2147483672" r:id="rId1"/>
+    <p:sldMasterId id="2147483684" r:id="rId1"/>
   </p:sldMasterIdLst>
   <p:sldIdLst>
     <p:sldId id="257" r:id="rId2"/>
   </p:sldIdLst>
-  <p:sldSz cx="9525000" cy="29384625"/>
+  <p:sldSz cx="9525000" cy="29670375"/>
   <p:notesSz cx="6858000" cy="9144000"/>
   <p:defaultTextStyle>
     <a:defPPr>
@@ -141,15 +141,15 @@
         </p:nvSpPr>
         <p:spPr>
           <a:xfrm>
-            <a:off x="714375" y="4809017"/>
-            <a:ext cx="8096250" cy="10230202"/>
+            <a:off x="714375" y="4855779"/>
+            <a:ext cx="8096250" cy="10329686"/>
           </a:xfrm>
         </p:spPr>
         <p:txBody>
           <a:bodyPr anchor="b"/>
           <a:lstStyle>
             <a:lvl1pPr algn="ctr">
-              <a:defRPr sz="6249"/>
+              <a:defRPr sz="6250"/>
             </a:lvl1pPr>
           </a:lstStyle>
           <a:p>
@@ -173,8 +173,8 @@
         </p:nvSpPr>
         <p:spPr>
           <a:xfrm>
-            <a:off x="1190625" y="15433735"/>
-            <a:ext cx="7143750" cy="7094479"/>
+            <a:off x="1190625" y="15583817"/>
+            <a:ext cx="7143750" cy="7163470"/>
           </a:xfrm>
         </p:spPr>
         <p:txBody>
@@ -184,35 +184,35 @@
               <a:buNone/>
               <a:defRPr sz="2500"/>
             </a:lvl1pPr>
-            <a:lvl2pPr marL="476193" indent="0" algn="ctr">
+            <a:lvl2pPr marL="476265" indent="0" algn="ctr">
               <a:buNone/>
               <a:defRPr sz="2083"/>
             </a:lvl2pPr>
-            <a:lvl3pPr marL="952386" indent="0" algn="ctr">
+            <a:lvl3pPr marL="952530" indent="0" algn="ctr">
               <a:buNone/>
               <a:defRPr sz="1875"/>
             </a:lvl3pPr>
-            <a:lvl4pPr marL="1428580" indent="0" algn="ctr">
+            <a:lvl4pPr marL="1428796" indent="0" algn="ctr">
               <a:buNone/>
               <a:defRPr sz="1667"/>
             </a:lvl4pPr>
-            <a:lvl5pPr marL="1904772" indent="0" algn="ctr">
+            <a:lvl5pPr marL="1905061" indent="0" algn="ctr">
               <a:buNone/>
               <a:defRPr sz="1667"/>
             </a:lvl5pPr>
-            <a:lvl6pPr marL="2380965" indent="0" algn="ctr">
+            <a:lvl6pPr marL="2381326" indent="0" algn="ctr">
               <a:buNone/>
               <a:defRPr sz="1667"/>
             </a:lvl6pPr>
-            <a:lvl7pPr marL="2857158" indent="0" algn="ctr">
+            <a:lvl7pPr marL="2857591" indent="0" algn="ctr">
               <a:buNone/>
               <a:defRPr sz="1667"/>
             </a:lvl7pPr>
-            <a:lvl8pPr marL="3333352" indent="0" algn="ctr">
+            <a:lvl8pPr marL="3333857" indent="0" algn="ctr">
               <a:buNone/>
               <a:defRPr sz="1667"/>
             </a:lvl8pPr>
-            <a:lvl9pPr marL="3809545" indent="0" algn="ctr">
+            <a:lvl9pPr marL="3810122" indent="0" algn="ctr">
               <a:buNone/>
               <a:defRPr sz="1667"/>
             </a:lvl9pPr>
@@ -243,7 +243,7 @@
           <a:p>
             <a:fld id="{2AE88528-DDCC-4DB1-844C-DD3FEDD6CA17}" type="datetimeFigureOut">
               <a:rPr lang="pl-PL" smtClean="0"/>
-              <a:t>2024-02-04</a:t>
+              <a:t>2024-02-11</a:t>
             </a:fld>
             <a:endParaRPr lang="pl-PL"/>
           </a:p>
@@ -294,7 +294,7 @@
     </p:spTree>
     <p:extLst>
       <p:ext uri="{BB962C8B-B14F-4D97-AF65-F5344CB8AC3E}">
-        <p14:creationId xmlns:p14="http://schemas.microsoft.com/office/powerpoint/2010/main" val="1614919307"/>
+        <p14:creationId xmlns:p14="http://schemas.microsoft.com/office/powerpoint/2010/main" val="1074280746"/>
       </p:ext>
     </p:extLst>
   </p:cSld>
@@ -413,7 +413,7 @@
           <a:p>
             <a:fld id="{2AE88528-DDCC-4DB1-844C-DD3FEDD6CA17}" type="datetimeFigureOut">
               <a:rPr lang="pl-PL" smtClean="0"/>
-              <a:t>2024-02-04</a:t>
+              <a:t>2024-02-11</a:t>
             </a:fld>
             <a:endParaRPr lang="pl-PL"/>
           </a:p>
@@ -464,7 +464,7 @@
     </p:spTree>
     <p:extLst>
       <p:ext uri="{BB962C8B-B14F-4D97-AF65-F5344CB8AC3E}">
-        <p14:creationId xmlns:p14="http://schemas.microsoft.com/office/powerpoint/2010/main" val="806416462"/>
+        <p14:creationId xmlns:p14="http://schemas.microsoft.com/office/powerpoint/2010/main" val="944248803"/>
       </p:ext>
     </p:extLst>
   </p:cSld>
@@ -503,8 +503,8 @@
         </p:nvSpPr>
         <p:spPr>
           <a:xfrm>
-            <a:off x="6816329" y="1564460"/>
-            <a:ext cx="2053828" cy="24902111"/>
+            <a:off x="6816329" y="1579673"/>
+            <a:ext cx="2053828" cy="25144271"/>
           </a:xfrm>
         </p:spPr>
         <p:txBody>
@@ -531,8 +531,8 @@
         </p:nvSpPr>
         <p:spPr>
           <a:xfrm>
-            <a:off x="654844" y="1564460"/>
-            <a:ext cx="6042422" cy="24902111"/>
+            <a:off x="654844" y="1579673"/>
+            <a:ext cx="6042422" cy="25144271"/>
           </a:xfrm>
         </p:spPr>
         <p:txBody>
@@ -593,7 +593,7 @@
           <a:p>
             <a:fld id="{2AE88528-DDCC-4DB1-844C-DD3FEDD6CA17}" type="datetimeFigureOut">
               <a:rPr lang="pl-PL" smtClean="0"/>
-              <a:t>2024-02-04</a:t>
+              <a:t>2024-02-11</a:t>
             </a:fld>
             <a:endParaRPr lang="pl-PL"/>
           </a:p>
@@ -644,7 +644,7 @@
     </p:spTree>
     <p:extLst>
       <p:ext uri="{BB962C8B-B14F-4D97-AF65-F5344CB8AC3E}">
-        <p14:creationId xmlns:p14="http://schemas.microsoft.com/office/powerpoint/2010/main" val="1424889307"/>
+        <p14:creationId xmlns:p14="http://schemas.microsoft.com/office/powerpoint/2010/main" val="3111467275"/>
       </p:ext>
     </p:extLst>
   </p:cSld>
@@ -763,7 +763,7 @@
           <a:p>
             <a:fld id="{2AE88528-DDCC-4DB1-844C-DD3FEDD6CA17}" type="datetimeFigureOut">
               <a:rPr lang="pl-PL" smtClean="0"/>
-              <a:t>2024-02-04</a:t>
+              <a:t>2024-02-11</a:t>
             </a:fld>
             <a:endParaRPr lang="pl-PL"/>
           </a:p>
@@ -814,7 +814,7 @@
     </p:spTree>
     <p:extLst>
       <p:ext uri="{BB962C8B-B14F-4D97-AF65-F5344CB8AC3E}">
-        <p14:creationId xmlns:p14="http://schemas.microsoft.com/office/powerpoint/2010/main" val="3635537566"/>
+        <p14:creationId xmlns:p14="http://schemas.microsoft.com/office/powerpoint/2010/main" val="2076525473"/>
       </p:ext>
     </p:extLst>
   </p:cSld>
@@ -853,15 +853,15 @@
         </p:nvSpPr>
         <p:spPr>
           <a:xfrm>
-            <a:off x="649884" y="7325760"/>
-            <a:ext cx="8215313" cy="12223186"/>
+            <a:off x="649883" y="7396998"/>
+            <a:ext cx="8215313" cy="12342050"/>
           </a:xfrm>
         </p:spPr>
         <p:txBody>
           <a:bodyPr anchor="b"/>
           <a:lstStyle>
             <a:lvl1pPr>
-              <a:defRPr sz="6249"/>
+              <a:defRPr sz="6250"/>
             </a:lvl1pPr>
           </a:lstStyle>
           <a:p>
@@ -885,8 +885,8 @@
         </p:nvSpPr>
         <p:spPr>
           <a:xfrm>
-            <a:off x="649884" y="19664582"/>
-            <a:ext cx="8215313" cy="6427884"/>
+            <a:off x="649883" y="19855808"/>
+            <a:ext cx="8215313" cy="6490392"/>
           </a:xfrm>
         </p:spPr>
         <p:txBody>
@@ -900,7 +900,7 @@
                 </a:solidFill>
               </a:defRPr>
             </a:lvl1pPr>
-            <a:lvl2pPr marL="476193" indent="0">
+            <a:lvl2pPr marL="476265" indent="0">
               <a:buNone/>
               <a:defRPr sz="2083">
                 <a:solidFill>
@@ -910,7 +910,7 @@
                 </a:solidFill>
               </a:defRPr>
             </a:lvl2pPr>
-            <a:lvl3pPr marL="952386" indent="0">
+            <a:lvl3pPr marL="952530" indent="0">
               <a:buNone/>
               <a:defRPr sz="1875">
                 <a:solidFill>
@@ -920,7 +920,7 @@
                 </a:solidFill>
               </a:defRPr>
             </a:lvl3pPr>
-            <a:lvl4pPr marL="1428580" indent="0">
+            <a:lvl4pPr marL="1428796" indent="0">
               <a:buNone/>
               <a:defRPr sz="1667">
                 <a:solidFill>
@@ -930,7 +930,7 @@
                 </a:solidFill>
               </a:defRPr>
             </a:lvl4pPr>
-            <a:lvl5pPr marL="1904772" indent="0">
+            <a:lvl5pPr marL="1905061" indent="0">
               <a:buNone/>
               <a:defRPr sz="1667">
                 <a:solidFill>
@@ -940,7 +940,7 @@
                 </a:solidFill>
               </a:defRPr>
             </a:lvl5pPr>
-            <a:lvl6pPr marL="2380965" indent="0">
+            <a:lvl6pPr marL="2381326" indent="0">
               <a:buNone/>
               <a:defRPr sz="1667">
                 <a:solidFill>
@@ -950,7 +950,7 @@
                 </a:solidFill>
               </a:defRPr>
             </a:lvl6pPr>
-            <a:lvl7pPr marL="2857158" indent="0">
+            <a:lvl7pPr marL="2857591" indent="0">
               <a:buNone/>
               <a:defRPr sz="1667">
                 <a:solidFill>
@@ -960,7 +960,7 @@
                 </a:solidFill>
               </a:defRPr>
             </a:lvl7pPr>
-            <a:lvl8pPr marL="3333352" indent="0">
+            <a:lvl8pPr marL="3333857" indent="0">
               <a:buNone/>
               <a:defRPr sz="1667">
                 <a:solidFill>
@@ -970,7 +970,7 @@
                 </a:solidFill>
               </a:defRPr>
             </a:lvl8pPr>
-            <a:lvl9pPr marL="3809545" indent="0">
+            <a:lvl9pPr marL="3810122" indent="0">
               <a:buNone/>
               <a:defRPr sz="1667">
                 <a:solidFill>
@@ -1007,7 +1007,7 @@
           <a:p>
             <a:fld id="{2AE88528-DDCC-4DB1-844C-DD3FEDD6CA17}" type="datetimeFigureOut">
               <a:rPr lang="pl-PL" smtClean="0"/>
-              <a:t>2024-02-04</a:t>
+              <a:t>2024-02-11</a:t>
             </a:fld>
             <a:endParaRPr lang="pl-PL"/>
           </a:p>
@@ -1058,7 +1058,7 @@
     </p:spTree>
     <p:extLst>
       <p:ext uri="{BB962C8B-B14F-4D97-AF65-F5344CB8AC3E}">
-        <p14:creationId xmlns:p14="http://schemas.microsoft.com/office/powerpoint/2010/main" val="2906212324"/>
+        <p14:creationId xmlns:p14="http://schemas.microsoft.com/office/powerpoint/2010/main" val="991250576"/>
       </p:ext>
     </p:extLst>
   </p:cSld>
@@ -1120,8 +1120,8 @@
         </p:nvSpPr>
         <p:spPr>
           <a:xfrm>
-            <a:off x="654844" y="7822297"/>
-            <a:ext cx="4048125" cy="18644275"/>
+            <a:off x="654844" y="7898364"/>
+            <a:ext cx="4048125" cy="18825580"/>
           </a:xfrm>
         </p:spPr>
         <p:txBody>
@@ -1177,8 +1177,8 @@
         </p:nvSpPr>
         <p:spPr>
           <a:xfrm>
-            <a:off x="4822032" y="7822297"/>
-            <a:ext cx="4048125" cy="18644275"/>
+            <a:off x="4822031" y="7898364"/>
+            <a:ext cx="4048125" cy="18825580"/>
           </a:xfrm>
         </p:spPr>
         <p:txBody>
@@ -1239,7 +1239,7 @@
           <a:p>
             <a:fld id="{2AE88528-DDCC-4DB1-844C-DD3FEDD6CA17}" type="datetimeFigureOut">
               <a:rPr lang="pl-PL" smtClean="0"/>
-              <a:t>2024-02-04</a:t>
+              <a:t>2024-02-11</a:t>
             </a:fld>
             <a:endParaRPr lang="pl-PL"/>
           </a:p>
@@ -1290,7 +1290,7 @@
     </p:spTree>
     <p:extLst>
       <p:ext uri="{BB962C8B-B14F-4D97-AF65-F5344CB8AC3E}">
-        <p14:creationId xmlns:p14="http://schemas.microsoft.com/office/powerpoint/2010/main" val="4024440129"/>
+        <p14:creationId xmlns:p14="http://schemas.microsoft.com/office/powerpoint/2010/main" val="1913136289"/>
       </p:ext>
     </p:extLst>
   </p:cSld>
@@ -1329,8 +1329,8 @@
         </p:nvSpPr>
         <p:spPr>
           <a:xfrm>
-            <a:off x="656085" y="1564465"/>
-            <a:ext cx="8215313" cy="5679670"/>
+            <a:off x="656084" y="1579679"/>
+            <a:ext cx="8215313" cy="5734901"/>
           </a:xfrm>
         </p:spPr>
         <p:txBody>
@@ -1357,8 +1357,8 @@
         </p:nvSpPr>
         <p:spPr>
           <a:xfrm>
-            <a:off x="656086" y="7203318"/>
-            <a:ext cx="4029521" cy="3530233"/>
+            <a:off x="656085" y="7273365"/>
+            <a:ext cx="4029521" cy="3564564"/>
           </a:xfrm>
         </p:spPr>
         <p:txBody>
@@ -1368,35 +1368,35 @@
               <a:buNone/>
               <a:defRPr sz="2500" b="1"/>
             </a:lvl1pPr>
-            <a:lvl2pPr marL="476193" indent="0">
+            <a:lvl2pPr marL="476265" indent="0">
               <a:buNone/>
               <a:defRPr sz="2083" b="1"/>
             </a:lvl2pPr>
-            <a:lvl3pPr marL="952386" indent="0">
+            <a:lvl3pPr marL="952530" indent="0">
               <a:buNone/>
               <a:defRPr sz="1875" b="1"/>
             </a:lvl3pPr>
-            <a:lvl4pPr marL="1428580" indent="0">
+            <a:lvl4pPr marL="1428796" indent="0">
               <a:buNone/>
               <a:defRPr sz="1667" b="1"/>
             </a:lvl4pPr>
-            <a:lvl5pPr marL="1904772" indent="0">
+            <a:lvl5pPr marL="1905061" indent="0">
               <a:buNone/>
               <a:defRPr sz="1667" b="1"/>
             </a:lvl5pPr>
-            <a:lvl6pPr marL="2380965" indent="0">
+            <a:lvl6pPr marL="2381326" indent="0">
               <a:buNone/>
               <a:defRPr sz="1667" b="1"/>
             </a:lvl6pPr>
-            <a:lvl7pPr marL="2857158" indent="0">
+            <a:lvl7pPr marL="2857591" indent="0">
               <a:buNone/>
               <a:defRPr sz="1667" b="1"/>
             </a:lvl7pPr>
-            <a:lvl8pPr marL="3333352" indent="0">
+            <a:lvl8pPr marL="3333857" indent="0">
               <a:buNone/>
               <a:defRPr sz="1667" b="1"/>
             </a:lvl8pPr>
-            <a:lvl9pPr marL="3809545" indent="0">
+            <a:lvl9pPr marL="3810122" indent="0">
               <a:buNone/>
               <a:defRPr sz="1667" b="1"/>
             </a:lvl9pPr>
@@ -1422,8 +1422,8 @@
         </p:nvSpPr>
         <p:spPr>
           <a:xfrm>
-            <a:off x="656086" y="10733553"/>
-            <a:ext cx="4029521" cy="15787435"/>
+            <a:off x="656085" y="10837928"/>
+            <a:ext cx="4029521" cy="15940961"/>
           </a:xfrm>
         </p:spPr>
         <p:txBody>
@@ -1479,8 +1479,8 @@
         </p:nvSpPr>
         <p:spPr>
           <a:xfrm>
-            <a:off x="4822032" y="7203318"/>
-            <a:ext cx="4049366" cy="3530233"/>
+            <a:off x="4822032" y="7273365"/>
+            <a:ext cx="4049366" cy="3564564"/>
           </a:xfrm>
         </p:spPr>
         <p:txBody>
@@ -1490,35 +1490,35 @@
               <a:buNone/>
               <a:defRPr sz="2500" b="1"/>
             </a:lvl1pPr>
-            <a:lvl2pPr marL="476193" indent="0">
+            <a:lvl2pPr marL="476265" indent="0">
               <a:buNone/>
               <a:defRPr sz="2083" b="1"/>
             </a:lvl2pPr>
-            <a:lvl3pPr marL="952386" indent="0">
+            <a:lvl3pPr marL="952530" indent="0">
               <a:buNone/>
               <a:defRPr sz="1875" b="1"/>
             </a:lvl3pPr>
-            <a:lvl4pPr marL="1428580" indent="0">
+            <a:lvl4pPr marL="1428796" indent="0">
               <a:buNone/>
               <a:defRPr sz="1667" b="1"/>
             </a:lvl4pPr>
-            <a:lvl5pPr marL="1904772" indent="0">
+            <a:lvl5pPr marL="1905061" indent="0">
               <a:buNone/>
               <a:defRPr sz="1667" b="1"/>
             </a:lvl5pPr>
-            <a:lvl6pPr marL="2380965" indent="0">
+            <a:lvl6pPr marL="2381326" indent="0">
               <a:buNone/>
               <a:defRPr sz="1667" b="1"/>
             </a:lvl6pPr>
-            <a:lvl7pPr marL="2857158" indent="0">
+            <a:lvl7pPr marL="2857591" indent="0">
               <a:buNone/>
               <a:defRPr sz="1667" b="1"/>
             </a:lvl7pPr>
-            <a:lvl8pPr marL="3333352" indent="0">
+            <a:lvl8pPr marL="3333857" indent="0">
               <a:buNone/>
               <a:defRPr sz="1667" b="1"/>
             </a:lvl8pPr>
-            <a:lvl9pPr marL="3809545" indent="0">
+            <a:lvl9pPr marL="3810122" indent="0">
               <a:buNone/>
               <a:defRPr sz="1667" b="1"/>
             </a:lvl9pPr>
@@ -1544,8 +1544,8 @@
         </p:nvSpPr>
         <p:spPr>
           <a:xfrm>
-            <a:off x="4822032" y="10733553"/>
-            <a:ext cx="4049366" cy="15787435"/>
+            <a:off x="4822032" y="10837928"/>
+            <a:ext cx="4049366" cy="15940961"/>
           </a:xfrm>
         </p:spPr>
         <p:txBody>
@@ -1606,7 +1606,7 @@
           <a:p>
             <a:fld id="{2AE88528-DDCC-4DB1-844C-DD3FEDD6CA17}" type="datetimeFigureOut">
               <a:rPr lang="pl-PL" smtClean="0"/>
-              <a:t>2024-02-04</a:t>
+              <a:t>2024-02-11</a:t>
             </a:fld>
             <a:endParaRPr lang="pl-PL"/>
           </a:p>
@@ -1657,7 +1657,7 @@
     </p:spTree>
     <p:extLst>
       <p:ext uri="{BB962C8B-B14F-4D97-AF65-F5344CB8AC3E}">
-        <p14:creationId xmlns:p14="http://schemas.microsoft.com/office/powerpoint/2010/main" val="476110028"/>
+        <p14:creationId xmlns:p14="http://schemas.microsoft.com/office/powerpoint/2010/main" val="2397855644"/>
       </p:ext>
     </p:extLst>
   </p:cSld>
@@ -1724,7 +1724,7 @@
           <a:p>
             <a:fld id="{2AE88528-DDCC-4DB1-844C-DD3FEDD6CA17}" type="datetimeFigureOut">
               <a:rPr lang="pl-PL" smtClean="0"/>
-              <a:t>2024-02-04</a:t>
+              <a:t>2024-02-11</a:t>
             </a:fld>
             <a:endParaRPr lang="pl-PL"/>
           </a:p>
@@ -1775,7 +1775,7 @@
     </p:spTree>
     <p:extLst>
       <p:ext uri="{BB962C8B-B14F-4D97-AF65-F5344CB8AC3E}">
-        <p14:creationId xmlns:p14="http://schemas.microsoft.com/office/powerpoint/2010/main" val="2812603624"/>
+        <p14:creationId xmlns:p14="http://schemas.microsoft.com/office/powerpoint/2010/main" val="1781352071"/>
       </p:ext>
     </p:extLst>
   </p:cSld>
@@ -1819,7 +1819,7 @@
           <a:p>
             <a:fld id="{2AE88528-DDCC-4DB1-844C-DD3FEDD6CA17}" type="datetimeFigureOut">
               <a:rPr lang="pl-PL" smtClean="0"/>
-              <a:t>2024-02-04</a:t>
+              <a:t>2024-02-11</a:t>
             </a:fld>
             <a:endParaRPr lang="pl-PL"/>
           </a:p>
@@ -1870,7 +1870,7 @@
     </p:spTree>
     <p:extLst>
       <p:ext uri="{BB962C8B-B14F-4D97-AF65-F5344CB8AC3E}">
-        <p14:creationId xmlns:p14="http://schemas.microsoft.com/office/powerpoint/2010/main" val="3493057528"/>
+        <p14:creationId xmlns:p14="http://schemas.microsoft.com/office/powerpoint/2010/main" val="3201350228"/>
       </p:ext>
     </p:extLst>
   </p:cSld>
@@ -1909,15 +1909,15 @@
         </p:nvSpPr>
         <p:spPr>
           <a:xfrm>
-            <a:off x="656085" y="1958975"/>
-            <a:ext cx="3072060" cy="6856413"/>
+            <a:off x="656085" y="1978025"/>
+            <a:ext cx="3072060" cy="6923088"/>
           </a:xfrm>
         </p:spPr>
         <p:txBody>
           <a:bodyPr anchor="b"/>
           <a:lstStyle>
             <a:lvl1pPr>
-              <a:defRPr sz="3332"/>
+              <a:defRPr sz="3333"/>
             </a:lvl1pPr>
           </a:lstStyle>
           <a:p>
@@ -1941,15 +1941,15 @@
         </p:nvSpPr>
         <p:spPr>
           <a:xfrm>
-            <a:off x="4049366" y="4230849"/>
-            <a:ext cx="4822031" cy="20882131"/>
+            <a:off x="4049366" y="4271991"/>
+            <a:ext cx="4822031" cy="21085197"/>
           </a:xfrm>
         </p:spPr>
         <p:txBody>
           <a:bodyPr/>
           <a:lstStyle>
             <a:lvl1pPr>
-              <a:defRPr sz="3332"/>
+              <a:defRPr sz="3333"/>
             </a:lvl1pPr>
             <a:lvl2pPr>
               <a:defRPr sz="2917"/>
@@ -2026,8 +2026,8 @@
         </p:nvSpPr>
         <p:spPr>
           <a:xfrm>
-            <a:off x="656085" y="8815388"/>
-            <a:ext cx="3072060" cy="16331595"/>
+            <a:off x="656085" y="8901112"/>
+            <a:ext cx="3072060" cy="16490412"/>
           </a:xfrm>
         </p:spPr>
         <p:txBody>
@@ -2037,35 +2037,35 @@
               <a:buNone/>
               <a:defRPr sz="1667"/>
             </a:lvl1pPr>
-            <a:lvl2pPr marL="476193" indent="0">
+            <a:lvl2pPr marL="476265" indent="0">
               <a:buNone/>
               <a:defRPr sz="1458"/>
             </a:lvl2pPr>
-            <a:lvl3pPr marL="952386" indent="0">
+            <a:lvl3pPr marL="952530" indent="0">
               <a:buNone/>
               <a:defRPr sz="1250"/>
             </a:lvl3pPr>
-            <a:lvl4pPr marL="1428580" indent="0">
+            <a:lvl4pPr marL="1428796" indent="0">
               <a:buNone/>
               <a:defRPr sz="1042"/>
             </a:lvl4pPr>
-            <a:lvl5pPr marL="1904772" indent="0">
+            <a:lvl5pPr marL="1905061" indent="0">
               <a:buNone/>
               <a:defRPr sz="1042"/>
             </a:lvl5pPr>
-            <a:lvl6pPr marL="2380965" indent="0">
+            <a:lvl6pPr marL="2381326" indent="0">
               <a:buNone/>
               <a:defRPr sz="1042"/>
             </a:lvl6pPr>
-            <a:lvl7pPr marL="2857158" indent="0">
+            <a:lvl7pPr marL="2857591" indent="0">
               <a:buNone/>
               <a:defRPr sz="1042"/>
             </a:lvl7pPr>
-            <a:lvl8pPr marL="3333352" indent="0">
+            <a:lvl8pPr marL="3333857" indent="0">
               <a:buNone/>
               <a:defRPr sz="1042"/>
             </a:lvl8pPr>
-            <a:lvl9pPr marL="3809545" indent="0">
+            <a:lvl9pPr marL="3810122" indent="0">
               <a:buNone/>
               <a:defRPr sz="1042"/>
             </a:lvl9pPr>
@@ -2096,7 +2096,7 @@
           <a:p>
             <a:fld id="{2AE88528-DDCC-4DB1-844C-DD3FEDD6CA17}" type="datetimeFigureOut">
               <a:rPr lang="pl-PL" smtClean="0"/>
-              <a:t>2024-02-04</a:t>
+              <a:t>2024-02-11</a:t>
             </a:fld>
             <a:endParaRPr lang="pl-PL"/>
           </a:p>
@@ -2147,7 +2147,7 @@
     </p:spTree>
     <p:extLst>
       <p:ext uri="{BB962C8B-B14F-4D97-AF65-F5344CB8AC3E}">
-        <p14:creationId xmlns:p14="http://schemas.microsoft.com/office/powerpoint/2010/main" val="297363281"/>
+        <p14:creationId xmlns:p14="http://schemas.microsoft.com/office/powerpoint/2010/main" val="2180629117"/>
       </p:ext>
     </p:extLst>
   </p:cSld>
@@ -2186,15 +2186,15 @@
         </p:nvSpPr>
         <p:spPr>
           <a:xfrm>
-            <a:off x="656085" y="1958975"/>
-            <a:ext cx="3072060" cy="6856413"/>
+            <a:off x="656085" y="1978025"/>
+            <a:ext cx="3072060" cy="6923088"/>
           </a:xfrm>
         </p:spPr>
         <p:txBody>
           <a:bodyPr anchor="b"/>
           <a:lstStyle>
             <a:lvl1pPr>
-              <a:defRPr sz="3332"/>
+              <a:defRPr sz="3333"/>
             </a:lvl1pPr>
           </a:lstStyle>
           <a:p>
@@ -2218,8 +2218,8 @@
         </p:nvSpPr>
         <p:spPr>
           <a:xfrm>
-            <a:off x="4049366" y="4230849"/>
-            <a:ext cx="4822031" cy="20882131"/>
+            <a:off x="4049366" y="4271991"/>
+            <a:ext cx="4822031" cy="21085197"/>
           </a:xfrm>
         </p:spPr>
         <p:txBody>
@@ -2227,37 +2227,37 @@
           <a:lstStyle>
             <a:lvl1pPr marL="0" indent="0">
               <a:buNone/>
-              <a:defRPr sz="3332"/>
+              <a:defRPr sz="3333"/>
             </a:lvl1pPr>
-            <a:lvl2pPr marL="476193" indent="0">
+            <a:lvl2pPr marL="476265" indent="0">
               <a:buNone/>
               <a:defRPr sz="2917"/>
             </a:lvl2pPr>
-            <a:lvl3pPr marL="952386" indent="0">
+            <a:lvl3pPr marL="952530" indent="0">
               <a:buNone/>
               <a:defRPr sz="2500"/>
             </a:lvl3pPr>
-            <a:lvl4pPr marL="1428580" indent="0">
+            <a:lvl4pPr marL="1428796" indent="0">
               <a:buNone/>
               <a:defRPr sz="2083"/>
             </a:lvl4pPr>
-            <a:lvl5pPr marL="1904772" indent="0">
+            <a:lvl5pPr marL="1905061" indent="0">
               <a:buNone/>
               <a:defRPr sz="2083"/>
             </a:lvl5pPr>
-            <a:lvl6pPr marL="2380965" indent="0">
+            <a:lvl6pPr marL="2381326" indent="0">
               <a:buNone/>
               <a:defRPr sz="2083"/>
             </a:lvl6pPr>
-            <a:lvl7pPr marL="2857158" indent="0">
+            <a:lvl7pPr marL="2857591" indent="0">
               <a:buNone/>
               <a:defRPr sz="2083"/>
             </a:lvl7pPr>
-            <a:lvl8pPr marL="3333352" indent="0">
+            <a:lvl8pPr marL="3333857" indent="0">
               <a:buNone/>
               <a:defRPr sz="2083"/>
             </a:lvl8pPr>
-            <a:lvl9pPr marL="3809545" indent="0">
+            <a:lvl9pPr marL="3810122" indent="0">
               <a:buNone/>
               <a:defRPr sz="2083"/>
             </a:lvl9pPr>
@@ -2283,8 +2283,8 @@
         </p:nvSpPr>
         <p:spPr>
           <a:xfrm>
-            <a:off x="656085" y="8815388"/>
-            <a:ext cx="3072060" cy="16331595"/>
+            <a:off x="656085" y="8901112"/>
+            <a:ext cx="3072060" cy="16490412"/>
           </a:xfrm>
         </p:spPr>
         <p:txBody>
@@ -2294,35 +2294,35 @@
               <a:buNone/>
               <a:defRPr sz="1667"/>
             </a:lvl1pPr>
-            <a:lvl2pPr marL="476193" indent="0">
+            <a:lvl2pPr marL="476265" indent="0">
               <a:buNone/>
               <a:defRPr sz="1458"/>
             </a:lvl2pPr>
-            <a:lvl3pPr marL="952386" indent="0">
+            <a:lvl3pPr marL="952530" indent="0">
               <a:buNone/>
               <a:defRPr sz="1250"/>
             </a:lvl3pPr>
-            <a:lvl4pPr marL="1428580" indent="0">
+            <a:lvl4pPr marL="1428796" indent="0">
               <a:buNone/>
               <a:defRPr sz="1042"/>
             </a:lvl4pPr>
-            <a:lvl5pPr marL="1904772" indent="0">
+            <a:lvl5pPr marL="1905061" indent="0">
               <a:buNone/>
               <a:defRPr sz="1042"/>
             </a:lvl5pPr>
-            <a:lvl6pPr marL="2380965" indent="0">
+            <a:lvl6pPr marL="2381326" indent="0">
               <a:buNone/>
               <a:defRPr sz="1042"/>
             </a:lvl6pPr>
-            <a:lvl7pPr marL="2857158" indent="0">
+            <a:lvl7pPr marL="2857591" indent="0">
               <a:buNone/>
               <a:defRPr sz="1042"/>
             </a:lvl7pPr>
-            <a:lvl8pPr marL="3333352" indent="0">
+            <a:lvl8pPr marL="3333857" indent="0">
               <a:buNone/>
               <a:defRPr sz="1042"/>
             </a:lvl8pPr>
-            <a:lvl9pPr marL="3809545" indent="0">
+            <a:lvl9pPr marL="3810122" indent="0">
               <a:buNone/>
               <a:defRPr sz="1042"/>
             </a:lvl9pPr>
@@ -2353,7 +2353,7 @@
           <a:p>
             <a:fld id="{2AE88528-DDCC-4DB1-844C-DD3FEDD6CA17}" type="datetimeFigureOut">
               <a:rPr lang="pl-PL" smtClean="0"/>
-              <a:t>2024-02-04</a:t>
+              <a:t>2024-02-11</a:t>
             </a:fld>
             <a:endParaRPr lang="pl-PL"/>
           </a:p>
@@ -2404,7 +2404,7 @@
     </p:spTree>
     <p:extLst>
       <p:ext uri="{BB962C8B-B14F-4D97-AF65-F5344CB8AC3E}">
-        <p14:creationId xmlns:p14="http://schemas.microsoft.com/office/powerpoint/2010/main" val="2132057862"/>
+        <p14:creationId xmlns:p14="http://schemas.microsoft.com/office/powerpoint/2010/main" val="813569724"/>
       </p:ext>
     </p:extLst>
   </p:cSld>
@@ -2448,8 +2448,8 @@
         </p:nvSpPr>
         <p:spPr>
           <a:xfrm>
-            <a:off x="654845" y="1564465"/>
-            <a:ext cx="8215313" cy="5679670"/>
+            <a:off x="654844" y="1579679"/>
+            <a:ext cx="8215313" cy="5734901"/>
           </a:xfrm>
           <a:prstGeom prst="rect">
             <a:avLst/>
@@ -2481,8 +2481,8 @@
         </p:nvSpPr>
         <p:spPr>
           <a:xfrm>
-            <a:off x="654845" y="7822297"/>
-            <a:ext cx="8215313" cy="18644275"/>
+            <a:off x="654844" y="7898364"/>
+            <a:ext cx="8215313" cy="18825580"/>
           </a:xfrm>
           <a:prstGeom prst="rect">
             <a:avLst/>
@@ -2543,8 +2543,8 @@
         </p:nvSpPr>
         <p:spPr>
           <a:xfrm>
-            <a:off x="654845" y="27235201"/>
-            <a:ext cx="2143125" cy="1564459"/>
+            <a:off x="654844" y="27500048"/>
+            <a:ext cx="2143125" cy="1579673"/>
           </a:xfrm>
           <a:prstGeom prst="rect">
             <a:avLst/>
@@ -2566,7 +2566,7 @@
           <a:p>
             <a:fld id="{2AE88528-DDCC-4DB1-844C-DD3FEDD6CA17}" type="datetimeFigureOut">
               <a:rPr lang="pl-PL" smtClean="0"/>
-              <a:t>2024-02-04</a:t>
+              <a:t>2024-02-11</a:t>
             </a:fld>
             <a:endParaRPr lang="pl-PL"/>
           </a:p>
@@ -2584,8 +2584,8 @@
         </p:nvSpPr>
         <p:spPr>
           <a:xfrm>
-            <a:off x="3155156" y="27235201"/>
-            <a:ext cx="3214688" cy="1564459"/>
+            <a:off x="3155156" y="27500048"/>
+            <a:ext cx="3214688" cy="1579673"/>
           </a:xfrm>
           <a:prstGeom prst="rect">
             <a:avLst/>
@@ -2621,8 +2621,8 @@
         </p:nvSpPr>
         <p:spPr>
           <a:xfrm>
-            <a:off x="6727032" y="27235201"/>
-            <a:ext cx="2143125" cy="1564459"/>
+            <a:off x="6727031" y="27500048"/>
+            <a:ext cx="2143125" cy="1579673"/>
           </a:xfrm>
           <a:prstGeom prst="rect">
             <a:avLst/>
@@ -2653,27 +2653,27 @@
     </p:spTree>
     <p:extLst>
       <p:ext uri="{BB962C8B-B14F-4D97-AF65-F5344CB8AC3E}">
-        <p14:creationId xmlns:p14="http://schemas.microsoft.com/office/powerpoint/2010/main" val="3154831812"/>
+        <p14:creationId xmlns:p14="http://schemas.microsoft.com/office/powerpoint/2010/main" val="2294816353"/>
       </p:ext>
     </p:extLst>
   </p:cSld>
   <p:clrMap bg1="lt1" tx1="dk1" bg2="lt2" tx2="dk2" accent1="accent1" accent2="accent2" accent3="accent3" accent4="accent4" accent5="accent5" accent6="accent6" hlink="hlink" folHlink="folHlink"/>
   <p:sldLayoutIdLst>
-    <p:sldLayoutId id="2147483673" r:id="rId1"/>
-    <p:sldLayoutId id="2147483674" r:id="rId2"/>
-    <p:sldLayoutId id="2147483675" r:id="rId3"/>
-    <p:sldLayoutId id="2147483676" r:id="rId4"/>
-    <p:sldLayoutId id="2147483677" r:id="rId5"/>
-    <p:sldLayoutId id="2147483678" r:id="rId6"/>
-    <p:sldLayoutId id="2147483679" r:id="rId7"/>
-    <p:sldLayoutId id="2147483680" r:id="rId8"/>
-    <p:sldLayoutId id="2147483681" r:id="rId9"/>
-    <p:sldLayoutId id="2147483682" r:id="rId10"/>
-    <p:sldLayoutId id="2147483683" r:id="rId11"/>
+    <p:sldLayoutId id="2147483685" r:id="rId1"/>
+    <p:sldLayoutId id="2147483686" r:id="rId2"/>
+    <p:sldLayoutId id="2147483687" r:id="rId3"/>
+    <p:sldLayoutId id="2147483688" r:id="rId4"/>
+    <p:sldLayoutId id="2147483689" r:id="rId5"/>
+    <p:sldLayoutId id="2147483690" r:id="rId6"/>
+    <p:sldLayoutId id="2147483691" r:id="rId7"/>
+    <p:sldLayoutId id="2147483692" r:id="rId8"/>
+    <p:sldLayoutId id="2147483693" r:id="rId9"/>
+    <p:sldLayoutId id="2147483694" r:id="rId10"/>
+    <p:sldLayoutId id="2147483695" r:id="rId11"/>
   </p:sldLayoutIdLst>
   <p:txStyles>
     <p:titleStyle>
-      <a:lvl1pPr algn="l" defTabSz="952386" rtl="0" eaLnBrk="1" latinLnBrk="0" hangingPunct="1">
+      <a:lvl1pPr algn="l" defTabSz="952530" rtl="0" eaLnBrk="1" latinLnBrk="0" hangingPunct="1">
         <a:lnSpc>
           <a:spcPct val="90000"/>
         </a:lnSpc>
@@ -2681,7 +2681,7 @@
           <a:spcPct val="0"/>
         </a:spcBef>
         <a:buNone/>
-        <a:defRPr sz="4582" kern="1200">
+        <a:defRPr sz="4583" kern="1200">
           <a:solidFill>
             <a:schemeClr val="tx1"/>
           </a:solidFill>
@@ -2692,7 +2692,7 @@
       </a:lvl1pPr>
     </p:titleStyle>
     <p:bodyStyle>
-      <a:lvl1pPr marL="238097" indent="-238097" algn="l" defTabSz="952386" rtl="0" eaLnBrk="1" latinLnBrk="0" hangingPunct="1">
+      <a:lvl1pPr marL="238133" indent="-238133" algn="l" defTabSz="952530" rtl="0" eaLnBrk="1" latinLnBrk="0" hangingPunct="1">
         <a:lnSpc>
           <a:spcPct val="90000"/>
         </a:lnSpc>
@@ -2710,7 +2710,7 @@
           <a:cs typeface="+mn-cs"/>
         </a:defRPr>
       </a:lvl1pPr>
-      <a:lvl2pPr marL="714290" indent="-238097" algn="l" defTabSz="952386" rtl="0" eaLnBrk="1" latinLnBrk="0" hangingPunct="1">
+      <a:lvl2pPr marL="714398" indent="-238133" algn="l" defTabSz="952530" rtl="0" eaLnBrk="1" latinLnBrk="0" hangingPunct="1">
         <a:lnSpc>
           <a:spcPct val="90000"/>
         </a:lnSpc>
@@ -2728,7 +2728,7 @@
           <a:cs typeface="+mn-cs"/>
         </a:defRPr>
       </a:lvl2pPr>
-      <a:lvl3pPr marL="1190482" indent="-238097" algn="l" defTabSz="952386" rtl="0" eaLnBrk="1" latinLnBrk="0" hangingPunct="1">
+      <a:lvl3pPr marL="1190663" indent="-238133" algn="l" defTabSz="952530" rtl="0" eaLnBrk="1" latinLnBrk="0" hangingPunct="1">
         <a:lnSpc>
           <a:spcPct val="90000"/>
         </a:lnSpc>
@@ -2746,7 +2746,7 @@
           <a:cs typeface="+mn-cs"/>
         </a:defRPr>
       </a:lvl3pPr>
-      <a:lvl4pPr marL="1666675" indent="-238097" algn="l" defTabSz="952386" rtl="0" eaLnBrk="1" latinLnBrk="0" hangingPunct="1">
+      <a:lvl4pPr marL="1666928" indent="-238133" algn="l" defTabSz="952530" rtl="0" eaLnBrk="1" latinLnBrk="0" hangingPunct="1">
         <a:lnSpc>
           <a:spcPct val="90000"/>
         </a:lnSpc>
@@ -2764,7 +2764,7 @@
           <a:cs typeface="+mn-cs"/>
         </a:defRPr>
       </a:lvl4pPr>
-      <a:lvl5pPr marL="2142869" indent="-238097" algn="l" defTabSz="952386" rtl="0" eaLnBrk="1" latinLnBrk="0" hangingPunct="1">
+      <a:lvl5pPr marL="2143194" indent="-238133" algn="l" defTabSz="952530" rtl="0" eaLnBrk="1" latinLnBrk="0" hangingPunct="1">
         <a:lnSpc>
           <a:spcPct val="90000"/>
         </a:lnSpc>
@@ -2782,7 +2782,7 @@
           <a:cs typeface="+mn-cs"/>
         </a:defRPr>
       </a:lvl5pPr>
-      <a:lvl6pPr marL="2619062" indent="-238097" algn="l" defTabSz="952386" rtl="0" eaLnBrk="1" latinLnBrk="0" hangingPunct="1">
+      <a:lvl6pPr marL="2619459" indent="-238133" algn="l" defTabSz="952530" rtl="0" eaLnBrk="1" latinLnBrk="0" hangingPunct="1">
         <a:lnSpc>
           <a:spcPct val="90000"/>
         </a:lnSpc>
@@ -2800,7 +2800,7 @@
           <a:cs typeface="+mn-cs"/>
         </a:defRPr>
       </a:lvl6pPr>
-      <a:lvl7pPr marL="3095255" indent="-238097" algn="l" defTabSz="952386" rtl="0" eaLnBrk="1" latinLnBrk="0" hangingPunct="1">
+      <a:lvl7pPr marL="3095724" indent="-238133" algn="l" defTabSz="952530" rtl="0" eaLnBrk="1" latinLnBrk="0" hangingPunct="1">
         <a:lnSpc>
           <a:spcPct val="90000"/>
         </a:lnSpc>
@@ -2818,7 +2818,7 @@
           <a:cs typeface="+mn-cs"/>
         </a:defRPr>
       </a:lvl7pPr>
-      <a:lvl8pPr marL="3571448" indent="-238097" algn="l" defTabSz="952386" rtl="0" eaLnBrk="1" latinLnBrk="0" hangingPunct="1">
+      <a:lvl8pPr marL="3571989" indent="-238133" algn="l" defTabSz="952530" rtl="0" eaLnBrk="1" latinLnBrk="0" hangingPunct="1">
         <a:lnSpc>
           <a:spcPct val="90000"/>
         </a:lnSpc>
@@ -2836,7 +2836,7 @@
           <a:cs typeface="+mn-cs"/>
         </a:defRPr>
       </a:lvl8pPr>
-      <a:lvl9pPr marL="4047642" indent="-238097" algn="l" defTabSz="952386" rtl="0" eaLnBrk="1" latinLnBrk="0" hangingPunct="1">
+      <a:lvl9pPr marL="4048255" indent="-238133" algn="l" defTabSz="952530" rtl="0" eaLnBrk="1" latinLnBrk="0" hangingPunct="1">
         <a:lnSpc>
           <a:spcPct val="90000"/>
         </a:lnSpc>
@@ -2859,7 +2859,7 @@
       <a:defPPr>
         <a:defRPr lang="en-US"/>
       </a:defPPr>
-      <a:lvl1pPr marL="0" algn="l" defTabSz="952386" rtl="0" eaLnBrk="1" latinLnBrk="0" hangingPunct="1">
+      <a:lvl1pPr marL="0" algn="l" defTabSz="952530" rtl="0" eaLnBrk="1" latinLnBrk="0" hangingPunct="1">
         <a:defRPr sz="1875" kern="1200">
           <a:solidFill>
             <a:schemeClr val="tx1"/>
@@ -2869,7 +2869,7 @@
           <a:cs typeface="+mn-cs"/>
         </a:defRPr>
       </a:lvl1pPr>
-      <a:lvl2pPr marL="476193" algn="l" defTabSz="952386" rtl="0" eaLnBrk="1" latinLnBrk="0" hangingPunct="1">
+      <a:lvl2pPr marL="476265" algn="l" defTabSz="952530" rtl="0" eaLnBrk="1" latinLnBrk="0" hangingPunct="1">
         <a:defRPr sz="1875" kern="1200">
           <a:solidFill>
             <a:schemeClr val="tx1"/>
@@ -2879,7 +2879,7 @@
           <a:cs typeface="+mn-cs"/>
         </a:defRPr>
       </a:lvl2pPr>
-      <a:lvl3pPr marL="952386" algn="l" defTabSz="952386" rtl="0" eaLnBrk="1" latinLnBrk="0" hangingPunct="1">
+      <a:lvl3pPr marL="952530" algn="l" defTabSz="952530" rtl="0" eaLnBrk="1" latinLnBrk="0" hangingPunct="1">
         <a:defRPr sz="1875" kern="1200">
           <a:solidFill>
             <a:schemeClr val="tx1"/>
@@ -2889,7 +2889,7 @@
           <a:cs typeface="+mn-cs"/>
         </a:defRPr>
       </a:lvl3pPr>
-      <a:lvl4pPr marL="1428580" algn="l" defTabSz="952386" rtl="0" eaLnBrk="1" latinLnBrk="0" hangingPunct="1">
+      <a:lvl4pPr marL="1428796" algn="l" defTabSz="952530" rtl="0" eaLnBrk="1" latinLnBrk="0" hangingPunct="1">
         <a:defRPr sz="1875" kern="1200">
           <a:solidFill>
             <a:schemeClr val="tx1"/>
@@ -2899,7 +2899,7 @@
           <a:cs typeface="+mn-cs"/>
         </a:defRPr>
       </a:lvl4pPr>
-      <a:lvl5pPr marL="1904772" algn="l" defTabSz="952386" rtl="0" eaLnBrk="1" latinLnBrk="0" hangingPunct="1">
+      <a:lvl5pPr marL="1905061" algn="l" defTabSz="952530" rtl="0" eaLnBrk="1" latinLnBrk="0" hangingPunct="1">
         <a:defRPr sz="1875" kern="1200">
           <a:solidFill>
             <a:schemeClr val="tx1"/>
@@ -2909,7 +2909,7 @@
           <a:cs typeface="+mn-cs"/>
         </a:defRPr>
       </a:lvl5pPr>
-      <a:lvl6pPr marL="2380965" algn="l" defTabSz="952386" rtl="0" eaLnBrk="1" latinLnBrk="0" hangingPunct="1">
+      <a:lvl6pPr marL="2381326" algn="l" defTabSz="952530" rtl="0" eaLnBrk="1" latinLnBrk="0" hangingPunct="1">
         <a:defRPr sz="1875" kern="1200">
           <a:solidFill>
             <a:schemeClr val="tx1"/>
@@ -2919,7 +2919,7 @@
           <a:cs typeface="+mn-cs"/>
         </a:defRPr>
       </a:lvl6pPr>
-      <a:lvl7pPr marL="2857158" algn="l" defTabSz="952386" rtl="0" eaLnBrk="1" latinLnBrk="0" hangingPunct="1">
+      <a:lvl7pPr marL="2857591" algn="l" defTabSz="952530" rtl="0" eaLnBrk="1" latinLnBrk="0" hangingPunct="1">
         <a:defRPr sz="1875" kern="1200">
           <a:solidFill>
             <a:schemeClr val="tx1"/>
@@ -2929,7 +2929,7 @@
           <a:cs typeface="+mn-cs"/>
         </a:defRPr>
       </a:lvl7pPr>
-      <a:lvl8pPr marL="3333352" algn="l" defTabSz="952386" rtl="0" eaLnBrk="1" latinLnBrk="0" hangingPunct="1">
+      <a:lvl8pPr marL="3333857" algn="l" defTabSz="952530" rtl="0" eaLnBrk="1" latinLnBrk="0" hangingPunct="1">
         <a:defRPr sz="1875" kern="1200">
           <a:solidFill>
             <a:schemeClr val="tx1"/>
@@ -2939,7 +2939,7 @@
           <a:cs typeface="+mn-cs"/>
         </a:defRPr>
       </a:lvl8pPr>
-      <a:lvl9pPr marL="3809545" algn="l" defTabSz="952386" rtl="0" eaLnBrk="1" latinLnBrk="0" hangingPunct="1">
+      <a:lvl9pPr marL="3810122" algn="l" defTabSz="952530" rtl="0" eaLnBrk="1" latinLnBrk="0" hangingPunct="1">
         <a:defRPr sz="1875" kern="1200">
           <a:solidFill>
             <a:schemeClr val="tx1"/>
@@ -3030,7 +3030,7 @@
         </p:blipFill>
         <p:spPr>
           <a:xfrm>
-            <a:off x="1" y="3"/>
+            <a:off x="1" y="142878"/>
             <a:ext cx="9525000" cy="29384622"/>
           </a:xfrm>
           <a:prstGeom prst="rect">
@@ -3040,10 +3040,10 @@
       </p:pic>
       <p:grpSp>
         <p:nvGrpSpPr>
-          <p:cNvPr id="33" name="Footer">
+          <p:cNvPr id="78" name="Footer">
             <a:extLst>
               <a:ext uri="{FF2B5EF4-FFF2-40B4-BE49-F238E27FC236}">
-                <a16:creationId xmlns:a16="http://schemas.microsoft.com/office/drawing/2014/main" id="{291DC8C4-DC8B-66F8-CB75-AF65561B373B}"/>
+                <a16:creationId xmlns:a16="http://schemas.microsoft.com/office/drawing/2014/main" id="{A3011F28-B36B-9378-E548-DD9286889155}"/>
               </a:ext>
             </a:extLst>
           </p:cNvPr>
@@ -3052,7 +3052,7 @@
         </p:nvGrpSpPr>
         <p:grpSpPr>
           <a:xfrm>
-            <a:off x="1" y="29001241"/>
+            <a:off x="0" y="29289375"/>
             <a:ext cx="9525000" cy="381000"/>
             <a:chOff x="1" y="29001241"/>
             <a:chExt cx="9525000" cy="381000"/>
@@ -3060,10 +3060,10 @@
         </p:grpSpPr>
         <p:sp>
           <p:nvSpPr>
-            <p:cNvPr id="23" name="Footer BG">
+            <p:cNvPr id="79" name="Footer BG">
               <a:extLst>
                 <a:ext uri="{FF2B5EF4-FFF2-40B4-BE49-F238E27FC236}">
-                  <a16:creationId xmlns:a16="http://schemas.microsoft.com/office/drawing/2014/main" id="{67150049-20EF-661A-76FC-4DD536216C16}"/>
+                  <a16:creationId xmlns:a16="http://schemas.microsoft.com/office/drawing/2014/main" id="{9433E982-9220-3EF7-FE09-C3870E017A1A}"/>
                 </a:ext>
               </a:extLst>
             </p:cNvPr>
@@ -3112,10 +3112,10 @@
         </p:sp>
         <p:sp>
           <p:nvSpPr>
-            <p:cNvPr id="30" name="Footer text">
+            <p:cNvPr id="80" name="Footer text">
               <a:extLst>
                 <a:ext uri="{FF2B5EF4-FFF2-40B4-BE49-F238E27FC236}">
-                  <a16:creationId xmlns:a16="http://schemas.microsoft.com/office/drawing/2014/main" id="{B9A539E9-87F6-27AA-C790-709BCB98EC12}"/>
+                  <a16:creationId xmlns:a16="http://schemas.microsoft.com/office/drawing/2014/main" id="{885264D3-63C9-830E-9E72-35C70F0648A9}"/>
                 </a:ext>
               </a:extLst>
             </p:cNvPr>
@@ -3176,10 +3176,10 @@
         </p:sp>
         <p:pic>
           <p:nvPicPr>
-            <p:cNvPr id="21" name="Logo kon-mat" descr="A white letter on a black background&#10;&#10;Description automatically generated">
+            <p:cNvPr id="81" name="Logo kon-mat" descr="A white letter on a black background&#10;&#10;Description automatically generated">
               <a:extLst>
                 <a:ext uri="{FF2B5EF4-FFF2-40B4-BE49-F238E27FC236}">
-                  <a16:creationId xmlns:a16="http://schemas.microsoft.com/office/drawing/2014/main" id="{54A0EBF5-24BC-CF45-74CE-EE91A1BDD0D1}"/>
+                  <a16:creationId xmlns:a16="http://schemas.microsoft.com/office/drawing/2014/main" id="{EC07027E-86D1-BF75-591F-4AC993F8F2E7}"/>
                 </a:ext>
               </a:extLst>
             </p:cNvPr>
@@ -3212,10 +3212,10 @@
         </p:pic>
         <p:pic>
           <p:nvPicPr>
-            <p:cNvPr id="27" name="Logo LinkedIn" descr="A blue square with white letters&#10;&#10;Description automatically generated">
+            <p:cNvPr id="82" name="Logo LinkedIn" descr="A blue square with white letters&#10;&#10;Description automatically generated">
               <a:extLst>
                 <a:ext uri="{FF2B5EF4-FFF2-40B4-BE49-F238E27FC236}">
-                  <a16:creationId xmlns:a16="http://schemas.microsoft.com/office/drawing/2014/main" id="{494D8F7E-3A35-C427-19B1-2116C13EC32D}"/>
+                  <a16:creationId xmlns:a16="http://schemas.microsoft.com/office/drawing/2014/main" id="{E4153A86-6CE1-9070-CCF8-4F1C567177FE}"/>
                 </a:ext>
               </a:extLst>
             </p:cNvPr>
@@ -3248,10 +3248,10 @@
         </p:pic>
         <p:pic>
           <p:nvPicPr>
-            <p:cNvPr id="25" name="Logo GitHub" descr="A black cat with a blue circle&#10;&#10;Description automatically generated">
+            <p:cNvPr id="83" name="Logo GitHub" descr="A black cat with a blue circle&#10;&#10;Description automatically generated">
               <a:extLst>
                 <a:ext uri="{FF2B5EF4-FFF2-40B4-BE49-F238E27FC236}">
-                  <a16:creationId xmlns:a16="http://schemas.microsoft.com/office/drawing/2014/main" id="{30E31A2D-77B3-C687-8626-6051F68FAD90}"/>
+                  <a16:creationId xmlns:a16="http://schemas.microsoft.com/office/drawing/2014/main" id="{E4875D02-A0F8-205D-D3F5-0248604BF724}"/>
                 </a:ext>
               </a:extLst>
             </p:cNvPr>
@@ -3284,10 +3284,10 @@
         </p:pic>
         <p:pic>
           <p:nvPicPr>
-            <p:cNvPr id="29" name="Logo Novy Pro" descr="A colorful logo with black background&#10;&#10;Description automatically generated">
+            <p:cNvPr id="84" name="Logo Novy Pro" descr="A colorful logo with black background&#10;&#10;Description automatically generated">
               <a:extLst>
                 <a:ext uri="{FF2B5EF4-FFF2-40B4-BE49-F238E27FC236}">
-                  <a16:creationId xmlns:a16="http://schemas.microsoft.com/office/drawing/2014/main" id="{E9CB325F-3F8B-26D2-69F3-656AB90DCF8A}"/>
+                  <a16:creationId xmlns:a16="http://schemas.microsoft.com/office/drawing/2014/main" id="{0649EC3F-8687-0617-135F-0A5453F27A50}"/>
                 </a:ext>
               </a:extLst>
             </p:cNvPr>
@@ -3321,10 +3321,10 @@
       </p:grpSp>
       <p:sp>
         <p:nvSpPr>
-          <p:cNvPr id="15" name="Bar - EbA BG">
+          <p:cNvPr id="85" name="Bar - EbA BG">
             <a:extLst>
               <a:ext uri="{FF2B5EF4-FFF2-40B4-BE49-F238E27FC236}">
-                <a16:creationId xmlns:a16="http://schemas.microsoft.com/office/drawing/2014/main" id="{012D96D1-4AFB-93D5-C45D-E4E7E589355D}"/>
+                <a16:creationId xmlns:a16="http://schemas.microsoft.com/office/drawing/2014/main" id="{7790CF73-A8FA-A950-149C-38018B9C9B79}"/>
               </a:ext>
             </a:extLst>
           </p:cNvPr>
@@ -3333,7 +3333,7 @@
         </p:nvSpPr>
         <p:spPr>
           <a:xfrm>
-            <a:off x="4918070" y="23630729"/>
+            <a:off x="4918070" y="23907750"/>
             <a:ext cx="4333875" cy="2095500"/>
           </a:xfrm>
           <a:prstGeom prst="roundRect">
@@ -3383,10 +3383,10 @@
       </p:sp>
       <p:sp>
         <p:nvSpPr>
-          <p:cNvPr id="16" name="Bar - EbG BG">
+          <p:cNvPr id="86" name="Bar - EbG BG">
             <a:extLst>
               <a:ext uri="{FF2B5EF4-FFF2-40B4-BE49-F238E27FC236}">
-                <a16:creationId xmlns:a16="http://schemas.microsoft.com/office/drawing/2014/main" id="{0D41AB6C-7D1A-0763-41E1-714DAD77113C}"/>
+                <a16:creationId xmlns:a16="http://schemas.microsoft.com/office/drawing/2014/main" id="{37FA8EB8-55C1-C15F-04D9-3A4528606CF7}"/>
               </a:ext>
             </a:extLst>
           </p:cNvPr>
@@ -3395,7 +3395,7 @@
         </p:nvSpPr>
         <p:spPr>
           <a:xfrm>
-            <a:off x="4918069" y="25869104"/>
+            <a:off x="4918069" y="26146125"/>
             <a:ext cx="4333875" cy="2857500"/>
           </a:xfrm>
           <a:prstGeom prst="roundRect">
@@ -3445,10 +3445,10 @@
       </p:sp>
       <p:sp>
         <p:nvSpPr>
-          <p:cNvPr id="13" name="Bar - EbGA BG">
+          <p:cNvPr id="87" name="Bar - EbGA BG">
             <a:extLst>
               <a:ext uri="{FF2B5EF4-FFF2-40B4-BE49-F238E27FC236}">
-                <a16:creationId xmlns:a16="http://schemas.microsoft.com/office/drawing/2014/main" id="{5F6ADBF3-2509-C1F9-7DCC-5F40E903A1FE}"/>
+                <a16:creationId xmlns:a16="http://schemas.microsoft.com/office/drawing/2014/main" id="{0A38B26F-306B-7255-60E3-225DB1649B41}"/>
               </a:ext>
             </a:extLst>
           </p:cNvPr>
@@ -3457,7 +3457,7 @@
         </p:nvSpPr>
         <p:spPr>
           <a:xfrm>
-            <a:off x="292097" y="23630729"/>
+            <a:off x="292097" y="23907750"/>
             <a:ext cx="4333875" cy="5095875"/>
           </a:xfrm>
           <a:prstGeom prst="roundRect">
@@ -3507,10 +3507,10 @@
       </p:sp>
       <p:sp>
         <p:nvSpPr>
-          <p:cNvPr id="12" name="Box Plot - EbG BG">
+          <p:cNvPr id="88" name="Box Plot - EbG BG">
             <a:extLst>
               <a:ext uri="{FF2B5EF4-FFF2-40B4-BE49-F238E27FC236}">
-                <a16:creationId xmlns:a16="http://schemas.microsoft.com/office/drawing/2014/main" id="{894164E8-281D-DDCA-BCAE-21DEF5A4484A}"/>
+                <a16:creationId xmlns:a16="http://schemas.microsoft.com/office/drawing/2014/main" id="{C42FC7AB-9FDC-6926-525B-6956A5F4E63B}"/>
               </a:ext>
             </a:extLst>
           </p:cNvPr>
@@ -3519,7 +3519,7 @@
         </p:nvSpPr>
         <p:spPr>
           <a:xfrm>
-            <a:off x="4918070" y="19324636"/>
+            <a:off x="4918070" y="19621500"/>
             <a:ext cx="4333875" cy="4000500"/>
           </a:xfrm>
           <a:prstGeom prst="roundRect">
@@ -3569,10 +3569,10 @@
       </p:sp>
       <p:sp>
         <p:nvSpPr>
-          <p:cNvPr id="11" name="Box Plot - EbA BG">
+          <p:cNvPr id="89" name="Box Plot - EbA BG">
             <a:extLst>
               <a:ext uri="{FF2B5EF4-FFF2-40B4-BE49-F238E27FC236}">
-                <a16:creationId xmlns:a16="http://schemas.microsoft.com/office/drawing/2014/main" id="{41F2848E-E14B-E380-4244-DC1FB2CB9E01}"/>
+                <a16:creationId xmlns:a16="http://schemas.microsoft.com/office/drawing/2014/main" id="{68D28D71-CB22-6BA3-9499-FE6E0CF7B10D}"/>
               </a:ext>
             </a:extLst>
           </p:cNvPr>
@@ -3581,7 +3581,7 @@
         </p:nvSpPr>
         <p:spPr>
           <a:xfrm>
-            <a:off x="292098" y="19324636"/>
+            <a:off x="292098" y="19621500"/>
             <a:ext cx="4333875" cy="4000500"/>
           </a:xfrm>
           <a:prstGeom prst="roundRect">
@@ -3631,10 +3631,10 @@
       </p:sp>
       <p:sp>
         <p:nvSpPr>
-          <p:cNvPr id="10" name="Bar - EbCA BG">
+          <p:cNvPr id="90" name="Bar - EbCA BG">
             <a:extLst>
               <a:ext uri="{FF2B5EF4-FFF2-40B4-BE49-F238E27FC236}">
-                <a16:creationId xmlns:a16="http://schemas.microsoft.com/office/drawing/2014/main" id="{0E81DB5D-39B3-5698-1FF1-62E82575BEF1}"/>
+                <a16:creationId xmlns:a16="http://schemas.microsoft.com/office/drawing/2014/main" id="{67CEB0C2-BDE2-F1D0-D2A6-E1CA7DFFEC34}"/>
               </a:ext>
             </a:extLst>
           </p:cNvPr>
@@ -3643,7 +3643,7 @@
         </p:nvSpPr>
         <p:spPr>
           <a:xfrm>
-            <a:off x="292100" y="15049499"/>
+            <a:off x="292100" y="15335250"/>
             <a:ext cx="8953500" cy="4000500"/>
           </a:xfrm>
           <a:prstGeom prst="roundRect">
@@ -3693,10 +3693,10 @@
       </p:sp>
       <p:sp>
         <p:nvSpPr>
-          <p:cNvPr id="9" name="Bar - EbCG BG">
+          <p:cNvPr id="91" name="Bar - EbCG BG">
             <a:extLst>
               <a:ext uri="{FF2B5EF4-FFF2-40B4-BE49-F238E27FC236}">
-                <a16:creationId xmlns:a16="http://schemas.microsoft.com/office/drawing/2014/main" id="{D990526A-E8A5-6E26-A439-C90B9157EA6F}"/>
+                <a16:creationId xmlns:a16="http://schemas.microsoft.com/office/drawing/2014/main" id="{ED64F8C1-49B7-3916-7DFC-B1B02436442C}"/>
               </a:ext>
             </a:extLst>
           </p:cNvPr>
@@ -3705,7 +3705,7 @@
         </p:nvSpPr>
         <p:spPr>
           <a:xfrm>
-            <a:off x="279401" y="10900568"/>
+            <a:off x="279401" y="11049000"/>
             <a:ext cx="8953500" cy="4000500"/>
           </a:xfrm>
           <a:prstGeom prst="roundRect">
@@ -3755,10 +3755,10 @@
       </p:sp>
       <p:sp>
         <p:nvSpPr>
-          <p:cNvPr id="8" name="Bar - EbC BG">
+          <p:cNvPr id="92" name="Bar - EbC BG">
             <a:extLst>
               <a:ext uri="{FF2B5EF4-FFF2-40B4-BE49-F238E27FC236}">
-                <a16:creationId xmlns:a16="http://schemas.microsoft.com/office/drawing/2014/main" id="{FE93D96C-6608-5F73-813F-F422668FD7F0}"/>
+                <a16:creationId xmlns:a16="http://schemas.microsoft.com/office/drawing/2014/main" id="{93B4B2C0-67A4-AE61-9752-CB8979DA598E}"/>
               </a:ext>
             </a:extLst>
           </p:cNvPr>
@@ -3817,10 +3817,10 @@
       </p:sp>
       <p:sp>
         <p:nvSpPr>
-          <p:cNvPr id="7" name="Box Plot - E BG">
+          <p:cNvPr id="93" name="Box Plot - E BG">
             <a:extLst>
               <a:ext uri="{FF2B5EF4-FFF2-40B4-BE49-F238E27FC236}">
-                <a16:creationId xmlns:a16="http://schemas.microsoft.com/office/drawing/2014/main" id="{EBE042E4-FE06-7CA7-75B6-913B053E4ED8}"/>
+                <a16:creationId xmlns:a16="http://schemas.microsoft.com/office/drawing/2014/main" id="{FE0630DD-DDBC-DEF6-9A47-B5750080A60B}"/>
               </a:ext>
             </a:extLst>
           </p:cNvPr>
@@ -3879,10 +3879,10 @@
       </p:sp>
       <p:sp>
         <p:nvSpPr>
-          <p:cNvPr id="6" name="Map - EbC BG">
+          <p:cNvPr id="94" name="Map - EbC BG">
             <a:extLst>
               <a:ext uri="{FF2B5EF4-FFF2-40B4-BE49-F238E27FC236}">
-                <a16:creationId xmlns:a16="http://schemas.microsoft.com/office/drawing/2014/main" id="{6DADB79C-D0B9-2F4B-C240-8F32EFF0ACB2}"/>
+                <a16:creationId xmlns:a16="http://schemas.microsoft.com/office/drawing/2014/main" id="{724CAEF0-26E3-91DF-C96B-9F5825D78BAA}"/>
               </a:ext>
             </a:extLst>
           </p:cNvPr>
@@ -3941,10 +3941,10 @@
       </p:sp>
       <p:sp>
         <p:nvSpPr>
-          <p:cNvPr id="17" name="Slicer Pane BG">
+          <p:cNvPr id="95" name="Slicer Pane BG">
             <a:extLst>
               <a:ext uri="{FF2B5EF4-FFF2-40B4-BE49-F238E27FC236}">
-                <a16:creationId xmlns:a16="http://schemas.microsoft.com/office/drawing/2014/main" id="{421C15B2-FB6F-EA1A-DD88-5D5473E695CC}"/>
+                <a16:creationId xmlns:a16="http://schemas.microsoft.com/office/drawing/2014/main" id="{3FF22036-75AB-8C9B-57D9-3EE4C27D0FC3}"/>
               </a:ext>
             </a:extLst>
           </p:cNvPr>
@@ -4003,10 +4003,10 @@
       </p:sp>
       <p:sp>
         <p:nvSpPr>
-          <p:cNvPr id="19" name="Header &amp; Nav BG">
+          <p:cNvPr id="96" name="Header &amp; Nav BG">
             <a:extLst>
               <a:ext uri="{FF2B5EF4-FFF2-40B4-BE49-F238E27FC236}">
-                <a16:creationId xmlns:a16="http://schemas.microsoft.com/office/drawing/2014/main" id="{71CC0687-5C6B-6AC3-0E30-B0EFA4575A49}"/>
+                <a16:creationId xmlns:a16="http://schemas.microsoft.com/office/drawing/2014/main" id="{DF8E854D-C37D-AD8E-8737-4A1D52CB29D6}"/>
               </a:ext>
             </a:extLst>
           </p:cNvPr>
@@ -4062,10 +4062,10 @@
       </p:sp>
       <p:sp>
         <p:nvSpPr>
-          <p:cNvPr id="35" name="Occupation Button">
+          <p:cNvPr id="97" name="Occupation Button">
             <a:extLst>
               <a:ext uri="{FF2B5EF4-FFF2-40B4-BE49-F238E27FC236}">
-                <a16:creationId xmlns:a16="http://schemas.microsoft.com/office/drawing/2014/main" id="{CC6C60F4-3049-552F-777F-AA1530A3A607}"/>
+                <a16:creationId xmlns:a16="http://schemas.microsoft.com/office/drawing/2014/main" id="{BAB42635-D27E-D273-C966-5AC52B98E02A}"/>
               </a:ext>
             </a:extLst>
           </p:cNvPr>
@@ -4139,10 +4139,10 @@
       </p:sp>
       <p:sp>
         <p:nvSpPr>
-          <p:cNvPr id="36" name="Overview Button">
+          <p:cNvPr id="98" name="Overview Button">
             <a:extLst>
               <a:ext uri="{FF2B5EF4-FFF2-40B4-BE49-F238E27FC236}">
-                <a16:creationId xmlns:a16="http://schemas.microsoft.com/office/drawing/2014/main" id="{BA9B3771-2A75-EFA6-5422-FDF442D13B20}"/>
+                <a16:creationId xmlns:a16="http://schemas.microsoft.com/office/drawing/2014/main" id="{9285E5EF-6E56-564A-0876-E7C216D80C9A}"/>
               </a:ext>
             </a:extLst>
           </p:cNvPr>
@@ -4208,10 +4208,10 @@
       </p:sp>
       <p:sp>
         <p:nvSpPr>
-          <p:cNvPr id="34" name="Landing Button">
+          <p:cNvPr id="99" name="Landing Button">
             <a:extLst>
               <a:ext uri="{FF2B5EF4-FFF2-40B4-BE49-F238E27FC236}">
-                <a16:creationId xmlns:a16="http://schemas.microsoft.com/office/drawing/2014/main" id="{EE2E2CDA-F2A2-DD43-7926-A90DA8C05E8B}"/>
+                <a16:creationId xmlns:a16="http://schemas.microsoft.com/office/drawing/2014/main" id="{387BA822-F945-C76E-88A4-6FF06F53F418}"/>
               </a:ext>
             </a:extLst>
           </p:cNvPr>
@@ -4305,10 +4305,10 @@
       </p:sp>
       <p:pic>
         <p:nvPicPr>
-          <p:cNvPr id="46" name="Occupation Icon" descr="A black background with a black square&#10;&#10;Description automatically generated with medium confidence">
+          <p:cNvPr id="100" name="Occupation Icon" descr="A black background with a black square&#10;&#10;Description automatically generated with medium confidence">
             <a:extLst>
               <a:ext uri="{FF2B5EF4-FFF2-40B4-BE49-F238E27FC236}">
-                <a16:creationId xmlns:a16="http://schemas.microsoft.com/office/drawing/2014/main" id="{11073793-D4C7-2CE4-2507-E9DE9B6EFE39}"/>
+                <a16:creationId xmlns:a16="http://schemas.microsoft.com/office/drawing/2014/main" id="{55E289A2-009D-5ECD-CA58-329AA5E1320C}"/>
               </a:ext>
             </a:extLst>
           </p:cNvPr>
@@ -4342,10 +4342,10 @@
       </p:pic>
       <p:pic>
         <p:nvPicPr>
-          <p:cNvPr id="48" name="Overview Icon" descr="A hand and a coin with a dollar sign&#10;&#10;Description automatically generated">
+          <p:cNvPr id="101" name="Overview Icon" descr="A hand and a coin with a dollar sign&#10;&#10;Description automatically generated">
             <a:extLst>
               <a:ext uri="{FF2B5EF4-FFF2-40B4-BE49-F238E27FC236}">
-                <a16:creationId xmlns:a16="http://schemas.microsoft.com/office/drawing/2014/main" id="{20AC1591-3A15-CA9F-223F-528141A91E18}"/>
+                <a16:creationId xmlns:a16="http://schemas.microsoft.com/office/drawing/2014/main" id="{29A7D2D2-D72F-DFD5-CBD4-098360609ABC}"/>
               </a:ext>
             </a:extLst>
           </p:cNvPr>
@@ -4378,10 +4378,10 @@
       </p:pic>
       <p:pic>
         <p:nvPicPr>
-          <p:cNvPr id="44" name="Landing Page Icon" descr="A black background with a black square&#10;&#10;Description automatically generated with medium confidence">
+          <p:cNvPr id="102" name="Landing Page Icon" descr="A black background with a black square&#10;&#10;Description automatically generated with medium confidence">
             <a:extLst>
               <a:ext uri="{FF2B5EF4-FFF2-40B4-BE49-F238E27FC236}">
-                <a16:creationId xmlns:a16="http://schemas.microsoft.com/office/drawing/2014/main" id="{25858237-49FF-8649-F0A7-7E1F346A0D65}"/>
+                <a16:creationId xmlns:a16="http://schemas.microsoft.com/office/drawing/2014/main" id="{1B77A394-3739-365B-9963-ABEC9FCC73F5}"/>
               </a:ext>
             </a:extLst>
           </p:cNvPr>
@@ -4427,9 +4427,9 @@
 </file>
 
 <file path=ppt/theme/theme1.xml><?xml version="1.0" encoding="utf-8"?>
-<a:theme xmlns:a="http://schemas.openxmlformats.org/drawingml/2006/main" name="Office Theme">
+<a:theme xmlns:a="http://schemas.openxmlformats.org/drawingml/2006/main" name="Office 2013 - 2022 Theme">
   <a:themeElements>
-    <a:clrScheme name="Office Theme">
+    <a:clrScheme name="Office 2013 - 2022 Theme">
       <a:dk1>
         <a:sysClr val="windowText" lastClr="000000"/>
       </a:dk1>
@@ -4467,7 +4467,7 @@
         <a:srgbClr val="954F72"/>
       </a:folHlink>
     </a:clrScheme>
-    <a:fontScheme name="Office Theme">
+    <a:fontScheme name="Office 2013 - 2022 Theme">
       <a:majorFont>
         <a:latin typeface="Calibri Light" panose="020F0302020204030204"/>
         <a:ea typeface=""/>
@@ -4539,7 +4539,7 @@
         <a:font script="Geor" typeface="Sylfaen"/>
       </a:minorFont>
     </a:fontScheme>
-    <a:fmtScheme name="Office Theme">
+    <a:fmtScheme name="Office 2013 - 2022 Theme">
       <a:fillStyleLst>
         <a:solidFill>
           <a:schemeClr val="phClr"/>

</xml_diff>